<commit_message>
Updated tutorials, added intro and lesson 6
</commit_message>
<xml_diff>
--- a/Installer/Tutorials/GearVRFTutorial-Lesson2.pptx
+++ b/Installer/Tutorials/GearVRFTutorial-Lesson2.pptx
@@ -251,7 +251,7 @@
           <a:p>
             <a:fld id="{0E28B5CE-A17E-45B2-B377-FA943BA06927}" type="datetimeFigureOut">
               <a:rPr lang="en-US" smtClean="0"/>
-              <a:t>7/15/2016</a:t>
+              <a:t>7/20/2016</a:t>
             </a:fld>
             <a:endParaRPr lang="en-US"/>
           </a:p>
@@ -421,7 +421,7 @@
           <a:p>
             <a:fld id="{0E28B5CE-A17E-45B2-B377-FA943BA06927}" type="datetimeFigureOut">
               <a:rPr lang="en-US" smtClean="0"/>
-              <a:t>7/15/2016</a:t>
+              <a:t>7/20/2016</a:t>
             </a:fld>
             <a:endParaRPr lang="en-US"/>
           </a:p>
@@ -601,7 +601,7 @@
           <a:p>
             <a:fld id="{0E28B5CE-A17E-45B2-B377-FA943BA06927}" type="datetimeFigureOut">
               <a:rPr lang="en-US" smtClean="0"/>
-              <a:t>7/15/2016</a:t>
+              <a:t>7/20/2016</a:t>
             </a:fld>
             <a:endParaRPr lang="en-US"/>
           </a:p>
@@ -771,7 +771,7 @@
           <a:p>
             <a:fld id="{0E28B5CE-A17E-45B2-B377-FA943BA06927}" type="datetimeFigureOut">
               <a:rPr lang="en-US" smtClean="0"/>
-              <a:t>7/15/2016</a:t>
+              <a:t>7/20/2016</a:t>
             </a:fld>
             <a:endParaRPr lang="en-US"/>
           </a:p>
@@ -1024,7 +1024,7 @@
           <a:p>
             <a:fld id="{0E28B5CE-A17E-45B2-B377-FA943BA06927}" type="datetimeFigureOut">
               <a:rPr lang="en-US" smtClean="0"/>
-              <a:t>7/15/2016</a:t>
+              <a:t>7/20/2016</a:t>
             </a:fld>
             <a:endParaRPr lang="en-US"/>
           </a:p>
@@ -1256,7 +1256,7 @@
           <a:p>
             <a:fld id="{0E28B5CE-A17E-45B2-B377-FA943BA06927}" type="datetimeFigureOut">
               <a:rPr lang="en-US" smtClean="0"/>
-              <a:t>7/15/2016</a:t>
+              <a:t>7/20/2016</a:t>
             </a:fld>
             <a:endParaRPr lang="en-US"/>
           </a:p>
@@ -1623,7 +1623,7 @@
           <a:p>
             <a:fld id="{0E28B5CE-A17E-45B2-B377-FA943BA06927}" type="datetimeFigureOut">
               <a:rPr lang="en-US" smtClean="0"/>
-              <a:t>7/15/2016</a:t>
+              <a:t>7/20/2016</a:t>
             </a:fld>
             <a:endParaRPr lang="en-US"/>
           </a:p>
@@ -1741,7 +1741,7 @@
           <a:p>
             <a:fld id="{0E28B5CE-A17E-45B2-B377-FA943BA06927}" type="datetimeFigureOut">
               <a:rPr lang="en-US" smtClean="0"/>
-              <a:t>7/15/2016</a:t>
+              <a:t>7/20/2016</a:t>
             </a:fld>
             <a:endParaRPr lang="en-US"/>
           </a:p>
@@ -1836,7 +1836,7 @@
           <a:p>
             <a:fld id="{0E28B5CE-A17E-45B2-B377-FA943BA06927}" type="datetimeFigureOut">
               <a:rPr lang="en-US" smtClean="0"/>
-              <a:t>7/15/2016</a:t>
+              <a:t>7/20/2016</a:t>
             </a:fld>
             <a:endParaRPr lang="en-US"/>
           </a:p>
@@ -2113,7 +2113,7 @@
           <a:p>
             <a:fld id="{0E28B5CE-A17E-45B2-B377-FA943BA06927}" type="datetimeFigureOut">
               <a:rPr lang="en-US" smtClean="0"/>
-              <a:t>7/15/2016</a:t>
+              <a:t>7/20/2016</a:t>
             </a:fld>
             <a:endParaRPr lang="en-US"/>
           </a:p>
@@ -2366,7 +2366,7 @@
           <a:p>
             <a:fld id="{0E28B5CE-A17E-45B2-B377-FA943BA06927}" type="datetimeFigureOut">
               <a:rPr lang="en-US" smtClean="0"/>
-              <a:t>7/15/2016</a:t>
+              <a:t>7/20/2016</a:t>
             </a:fld>
             <a:endParaRPr lang="en-US"/>
           </a:p>
@@ -2597,7 +2597,7 @@
           <a:p>
             <a:fld id="{0E28B5CE-A17E-45B2-B377-FA943BA06927}" type="datetimeFigureOut">
               <a:rPr lang="en-US" smtClean="0"/>
-              <a:t>7/15/2016</a:t>
+              <a:t>7/20/2016</a:t>
             </a:fld>
             <a:endParaRPr lang="en-US"/>
           </a:p>
@@ -8055,11 +8055,7 @@
           <a:p>
             <a:r>
               <a:rPr lang="en-US" dirty="0" smtClean="0"/>
-              <a:t>3D scene is a tree of </a:t>
-            </a:r>
-            <a:r>
-              <a:rPr lang="en-US" dirty="0" smtClean="0"/>
-              <a:t>3D objects</a:t>
+              <a:t>3D scene is a tree of 3D objects</a:t>
             </a:r>
           </a:p>
           <a:p>
@@ -8107,7 +8103,6 @@
               <a:rPr lang="en-US" dirty="0" smtClean="0"/>
               <a:t>Only one type of component per object</a:t>
             </a:r>
-            <a:endParaRPr lang="en-US" dirty="0" smtClean="0"/>
           </a:p>
           <a:p>
             <a:pPr lvl="1"/>

</xml_diff>